<commit_message>
[Document] renew spec document
</commit_message>
<xml_diff>
--- a/other/doc/TraceLogMonitorWithWAS.pptx
+++ b/other/doc/TraceLogMonitorWithWAS.pptx
@@ -6,7 +6,7 @@
     <p:sldMasterId id="2147483664" r:id="rId2"/>
   </p:sldMasterIdLst>
   <p:notesMasterIdLst>
-    <p:notesMasterId r:id="rId11"/>
+    <p:notesMasterId r:id="rId13"/>
   </p:notesMasterIdLst>
   <p:sldIdLst>
     <p:sldId id="256" r:id="rId3"/>
@@ -15,8 +15,10 @@
     <p:sldId id="303" r:id="rId6"/>
     <p:sldId id="306" r:id="rId7"/>
     <p:sldId id="282" r:id="rId8"/>
-    <p:sldId id="258" r:id="rId9"/>
-    <p:sldId id="305" r:id="rId10"/>
+    <p:sldId id="310" r:id="rId9"/>
+    <p:sldId id="311" r:id="rId10"/>
+    <p:sldId id="307" r:id="rId11"/>
+    <p:sldId id="309" r:id="rId12"/>
   </p:sldIdLst>
   <p:sldSz cx="9144000" cy="6858000" type="screen4x3"/>
   <p:notesSz cx="6858000" cy="9144000"/>
@@ -224,7 +226,7 @@
           <a:p>
             <a:fld id="{E4664BB7-D0FA-BA4C-A193-11994DEA009D}" type="datetimeFigureOut">
               <a:rPr kumimoji="1" lang="zh-TW" altLang="en-US" smtClean="0"/>
-              <a:t>2018/3/26</a:t>
+              <a:t>2018/6/25</a:t>
             </a:fld>
             <a:endParaRPr kumimoji="1" lang="zh-TW" altLang="en-US"/>
           </a:p>
@@ -566,7 +568,7 @@
     </p:spTree>
     <p:extLst>
       <p:ext uri="{BB962C8B-B14F-4D97-AF65-F5344CB8AC3E}">
-        <p14:creationId xmlns:p14="http://schemas.microsoft.com/office/powerpoint/2010/main" val="54908091"/>
+        <p14:creationId xmlns:p14="http://schemas.microsoft.com/office/powerpoint/2010/main" val="46571027"/>
       </p:ext>
     </p:extLst>
   </p:cSld>
@@ -650,7 +652,175 @@
     </p:spTree>
     <p:extLst>
       <p:ext uri="{BB962C8B-B14F-4D97-AF65-F5344CB8AC3E}">
-        <p14:creationId xmlns:p14="http://schemas.microsoft.com/office/powerpoint/2010/main" val="316175109"/>
+        <p14:creationId xmlns:p14="http://schemas.microsoft.com/office/powerpoint/2010/main" val="915512622"/>
+      </p:ext>
+    </p:extLst>
+  </p:cSld>
+  <p:clrMapOvr>
+    <a:masterClrMapping/>
+  </p:clrMapOvr>
+</p:notes>
+</file>
+
+<file path=ppt/notesSlides/notesSlide3.xml><?xml version="1.0" encoding="utf-8"?>
+<p:notes xmlns:a="http://schemas.openxmlformats.org/drawingml/2006/main" xmlns:r="http://schemas.openxmlformats.org/officeDocument/2006/relationships" xmlns:p="http://schemas.openxmlformats.org/presentationml/2006/main">
+  <p:cSld>
+    <p:spTree>
+      <p:nvGrpSpPr>
+        <p:cNvPr id="1" name=""/>
+        <p:cNvGrpSpPr/>
+        <p:nvPr/>
+      </p:nvGrpSpPr>
+      <p:grpSpPr>
+        <a:xfrm>
+          <a:off x="0" y="0"/>
+          <a:ext cx="0" cy="0"/>
+          <a:chOff x="0" y="0"/>
+          <a:chExt cx="0" cy="0"/>
+        </a:xfrm>
+      </p:grpSpPr>
+      <p:sp>
+        <p:nvSpPr>
+          <p:cNvPr id="2" name="投影片影像版面配置區 1"/>
+          <p:cNvSpPr>
+            <a:spLocks noGrp="1" noRot="1" noChangeAspect="1"/>
+          </p:cNvSpPr>
+          <p:nvPr>
+            <p:ph type="sldImg"/>
+          </p:nvPr>
+        </p:nvSpPr>
+        <p:spPr/>
+      </p:sp>
+      <p:sp>
+        <p:nvSpPr>
+          <p:cNvPr id="3" name="備忘稿版面配置區 2"/>
+          <p:cNvSpPr>
+            <a:spLocks noGrp="1"/>
+          </p:cNvSpPr>
+          <p:nvPr>
+            <p:ph type="body" idx="1"/>
+          </p:nvPr>
+        </p:nvSpPr>
+        <p:spPr/>
+        <p:txBody>
+          <a:bodyPr/>
+          <a:lstStyle/>
+          <a:p>
+            <a:endParaRPr kumimoji="1" lang="zh-TW" altLang="en-US" dirty="0"/>
+          </a:p>
+        </p:txBody>
+      </p:sp>
+      <p:sp>
+        <p:nvSpPr>
+          <p:cNvPr id="4" name="投影片編號版面配置區 3"/>
+          <p:cNvSpPr>
+            <a:spLocks noGrp="1"/>
+          </p:cNvSpPr>
+          <p:nvPr>
+            <p:ph type="sldNum" sz="quarter" idx="10"/>
+          </p:nvPr>
+        </p:nvSpPr>
+        <p:spPr/>
+        <p:txBody>
+          <a:bodyPr/>
+          <a:lstStyle/>
+          <a:p>
+            <a:fld id="{ABDC4079-0EF4-B448-BEE2-3DF7E1273377}" type="slidenum">
+              <a:rPr kumimoji="1" lang="zh-TW" altLang="en-US" smtClean="0"/>
+              <a:t>9</a:t>
+            </a:fld>
+            <a:endParaRPr kumimoji="1" lang="zh-TW" altLang="en-US"/>
+          </a:p>
+        </p:txBody>
+      </p:sp>
+    </p:spTree>
+    <p:extLst>
+      <p:ext uri="{BB962C8B-B14F-4D97-AF65-F5344CB8AC3E}">
+        <p14:creationId xmlns:p14="http://schemas.microsoft.com/office/powerpoint/2010/main" val="767542341"/>
+      </p:ext>
+    </p:extLst>
+  </p:cSld>
+  <p:clrMapOvr>
+    <a:masterClrMapping/>
+  </p:clrMapOvr>
+</p:notes>
+</file>
+
+<file path=ppt/notesSlides/notesSlide4.xml><?xml version="1.0" encoding="utf-8"?>
+<p:notes xmlns:a="http://schemas.openxmlformats.org/drawingml/2006/main" xmlns:r="http://schemas.openxmlformats.org/officeDocument/2006/relationships" xmlns:p="http://schemas.openxmlformats.org/presentationml/2006/main">
+  <p:cSld>
+    <p:spTree>
+      <p:nvGrpSpPr>
+        <p:cNvPr id="1" name=""/>
+        <p:cNvGrpSpPr/>
+        <p:nvPr/>
+      </p:nvGrpSpPr>
+      <p:grpSpPr>
+        <a:xfrm>
+          <a:off x="0" y="0"/>
+          <a:ext cx="0" cy="0"/>
+          <a:chOff x="0" y="0"/>
+          <a:chExt cx="0" cy="0"/>
+        </a:xfrm>
+      </p:grpSpPr>
+      <p:sp>
+        <p:nvSpPr>
+          <p:cNvPr id="2" name="投影片影像版面配置區 1"/>
+          <p:cNvSpPr>
+            <a:spLocks noGrp="1" noRot="1" noChangeAspect="1"/>
+          </p:cNvSpPr>
+          <p:nvPr>
+            <p:ph type="sldImg"/>
+          </p:nvPr>
+        </p:nvSpPr>
+        <p:spPr/>
+      </p:sp>
+      <p:sp>
+        <p:nvSpPr>
+          <p:cNvPr id="3" name="備忘稿版面配置區 2"/>
+          <p:cNvSpPr>
+            <a:spLocks noGrp="1"/>
+          </p:cNvSpPr>
+          <p:nvPr>
+            <p:ph type="body" idx="1"/>
+          </p:nvPr>
+        </p:nvSpPr>
+        <p:spPr/>
+        <p:txBody>
+          <a:bodyPr/>
+          <a:lstStyle/>
+          <a:p>
+            <a:endParaRPr kumimoji="1" lang="zh-TW" altLang="en-US" dirty="0"/>
+          </a:p>
+        </p:txBody>
+      </p:sp>
+      <p:sp>
+        <p:nvSpPr>
+          <p:cNvPr id="4" name="投影片編號版面配置區 3"/>
+          <p:cNvSpPr>
+            <a:spLocks noGrp="1"/>
+          </p:cNvSpPr>
+          <p:nvPr>
+            <p:ph type="sldNum" sz="quarter" idx="10"/>
+          </p:nvPr>
+        </p:nvSpPr>
+        <p:spPr/>
+        <p:txBody>
+          <a:bodyPr/>
+          <a:lstStyle/>
+          <a:p>
+            <a:fld id="{ABDC4079-0EF4-B448-BEE2-3DF7E1273377}" type="slidenum">
+              <a:rPr kumimoji="1" lang="zh-TW" altLang="en-US" smtClean="0"/>
+              <a:t>10</a:t>
+            </a:fld>
+            <a:endParaRPr kumimoji="1" lang="zh-TW" altLang="en-US"/>
+          </a:p>
+        </p:txBody>
+      </p:sp>
+    </p:spTree>
+    <p:extLst>
+      <p:ext uri="{BB962C8B-B14F-4D97-AF65-F5344CB8AC3E}">
+        <p14:creationId xmlns:p14="http://schemas.microsoft.com/office/powerpoint/2010/main" val="286077544"/>
       </p:ext>
     </p:extLst>
   </p:cSld>
@@ -1011,7 +1181,7 @@
           <a:p>
             <a:fld id="{79D8B742-D1FD-4176-A332-764EC9EA98CF}" type="datetimeFigureOut">
               <a:rPr lang="zh-TW" altLang="en-US" smtClean="0"/>
-              <a:t>2018/3/26</a:t>
+              <a:t>2018/6/25</a:t>
             </a:fld>
             <a:endParaRPr lang="zh-TW" altLang="en-US"/>
           </a:p>
@@ -3541,6 +3711,164 @@
 </p:sld>
 </file>
 
+<file path=ppt/slides/slide10.xml><?xml version="1.0" encoding="utf-8"?>
+<p:sld xmlns:a="http://schemas.openxmlformats.org/drawingml/2006/main" xmlns:r="http://schemas.openxmlformats.org/officeDocument/2006/relationships" xmlns:p="http://schemas.openxmlformats.org/presentationml/2006/main">
+  <p:cSld>
+    <p:spTree>
+      <p:nvGrpSpPr>
+        <p:cNvPr id="1" name=""/>
+        <p:cNvGrpSpPr/>
+        <p:nvPr/>
+      </p:nvGrpSpPr>
+      <p:grpSpPr>
+        <a:xfrm>
+          <a:off x="0" y="0"/>
+          <a:ext cx="0" cy="0"/>
+          <a:chOff x="0" y="0"/>
+          <a:chExt cx="0" cy="0"/>
+        </a:xfrm>
+      </p:grpSpPr>
+      <p:sp>
+        <p:nvSpPr>
+          <p:cNvPr id="2" name="標題 1"/>
+          <p:cNvSpPr>
+            <a:spLocks noGrp="1"/>
+          </p:cNvSpPr>
+          <p:nvPr>
+            <p:ph type="title"/>
+          </p:nvPr>
+        </p:nvSpPr>
+        <p:spPr/>
+        <p:txBody>
+          <a:bodyPr>
+            <a:normAutofit/>
+          </a:bodyPr>
+          <a:lstStyle/>
+          <a:p>
+            <a:r>
+              <a:rPr kumimoji="1" lang="zh-TW" altLang="en-US" dirty="0"/>
+              <a:t>參數檔</a:t>
+            </a:r>
+            <a:r>
+              <a:rPr kumimoji="1" lang="zh-TW" altLang="en-US" dirty="0" smtClean="0"/>
+              <a:t>變數</a:t>
+            </a:r>
+            <a:r>
+              <a:rPr kumimoji="1" lang="en-US" altLang="zh-TW" dirty="0" smtClean="0"/>
+              <a:t>(SMS)</a:t>
+            </a:r>
+            <a:endParaRPr lang="zh-TW" altLang="en-US" dirty="0"/>
+          </a:p>
+        </p:txBody>
+      </p:sp>
+      <p:sp>
+        <p:nvSpPr>
+          <p:cNvPr id="3" name="內容版面配置區 2"/>
+          <p:cNvSpPr>
+            <a:spLocks noGrp="1"/>
+          </p:cNvSpPr>
+          <p:nvPr>
+            <p:ph idx="1"/>
+          </p:nvPr>
+        </p:nvSpPr>
+        <p:spPr/>
+        <p:txBody>
+          <a:bodyPr>
+            <a:normAutofit/>
+          </a:bodyPr>
+          <a:lstStyle/>
+          <a:p>
+            <a:r>
+              <a:rPr lang="en-US" altLang="zh-TW" dirty="0" err="1" smtClean="0"/>
+              <a:t>sms.host</a:t>
+            </a:r>
+            <a:endParaRPr lang="en-US" altLang="zh-TW" dirty="0"/>
+          </a:p>
+          <a:p>
+            <a:r>
+              <a:rPr lang="en-US" altLang="zh-TW" dirty="0" err="1" smtClean="0"/>
+              <a:t>sms.port</a:t>
+            </a:r>
+            <a:endParaRPr lang="en-US" altLang="zh-TW" dirty="0" smtClean="0"/>
+          </a:p>
+          <a:p>
+            <a:r>
+              <a:rPr lang="en-US" altLang="zh-TW" dirty="0" err="1" smtClean="0"/>
+              <a:t>sms.entry</a:t>
+            </a:r>
+            <a:endParaRPr lang="en-US" altLang="zh-TW" dirty="0" smtClean="0"/>
+          </a:p>
+          <a:p>
+            <a:r>
+              <a:rPr lang="en-US" altLang="zh-TW" dirty="0" err="1" smtClean="0"/>
+              <a:t>sms.username</a:t>
+            </a:r>
+            <a:endParaRPr lang="en-US" altLang="zh-TW" dirty="0"/>
+          </a:p>
+          <a:p>
+            <a:r>
+              <a:rPr lang="en-US" altLang="zh-TW" dirty="0" err="1" smtClean="0"/>
+              <a:t>sms.password</a:t>
+            </a:r>
+            <a:endParaRPr lang="en-US" altLang="zh-TW" dirty="0" smtClean="0"/>
+          </a:p>
+          <a:p>
+            <a:r>
+              <a:rPr lang="en-US" altLang="zh-TW" dirty="0" err="1" smtClean="0"/>
+              <a:t>proxy.enable</a:t>
+            </a:r>
+            <a:endParaRPr lang="en-US" altLang="zh-TW" dirty="0" smtClean="0"/>
+          </a:p>
+          <a:p>
+            <a:r>
+              <a:rPr lang="en-US" altLang="zh-TW" dirty="0" err="1" smtClean="0"/>
+              <a:t>proxy.host</a:t>
+            </a:r>
+            <a:endParaRPr lang="en-US" altLang="zh-TW" dirty="0" smtClean="0"/>
+          </a:p>
+          <a:p>
+            <a:r>
+              <a:rPr lang="en-US" altLang="zh-TW" dirty="0" err="1" smtClean="0"/>
+              <a:t>proxy.port</a:t>
+            </a:r>
+            <a:endParaRPr lang="en-US" altLang="zh-TW" dirty="0" smtClean="0"/>
+          </a:p>
+          <a:p>
+            <a:r>
+              <a:rPr lang="en-US" altLang="zh-TW" dirty="0" err="1" smtClean="0"/>
+              <a:t>sms.encoding</a:t>
+            </a:r>
+            <a:r>
+              <a:rPr lang="en-US" altLang="zh-TW" dirty="0"/>
+              <a:t/>
+            </a:r>
+            <a:br>
+              <a:rPr lang="en-US" altLang="zh-TW" dirty="0"/>
+            </a:br>
+            <a:endParaRPr kumimoji="1" lang="en-US" altLang="zh-TW" dirty="0"/>
+          </a:p>
+        </p:txBody>
+      </p:sp>
+    </p:spTree>
+    <p:extLst>
+      <p:ext uri="{BB962C8B-B14F-4D97-AF65-F5344CB8AC3E}">
+        <p14:creationId xmlns:p14="http://schemas.microsoft.com/office/powerpoint/2010/main" val="1798168825"/>
+      </p:ext>
+    </p:extLst>
+  </p:cSld>
+  <p:clrMapOvr>
+    <a:masterClrMapping/>
+  </p:clrMapOvr>
+  <p:timing>
+    <p:tnLst>
+      <p:par>
+        <p:cTn id="1" dur="indefinite" restart="never" nodeType="tmRoot"/>
+      </p:par>
+    </p:tnLst>
+  </p:timing>
+</p:sld>
+</file>
+
 <file path=ppt/slides/slide2.xml><?xml version="1.0" encoding="utf-8"?>
 <p:sld xmlns:a="http://schemas.openxmlformats.org/drawingml/2006/main" xmlns:r="http://schemas.openxmlformats.org/officeDocument/2006/relationships" xmlns:p="http://schemas.openxmlformats.org/presentationml/2006/main">
   <p:cSld>
@@ -3606,11 +3934,7 @@
             </a:r>
             <a:r>
               <a:rPr kumimoji="1" lang="zh-TW" altLang="en-US" dirty="0" smtClean="0"/>
-              <a:t>因執行緒超量，造成當機之前，能夠提前發出</a:t>
-            </a:r>
-            <a:r>
-              <a:rPr kumimoji="1" lang="zh-TW" altLang="en-US" dirty="0" smtClean="0"/>
-              <a:t>警告。</a:t>
+              <a:t>因執行緒超量，造成當機之前，能夠提前發出警告。</a:t>
             </a:r>
             <a:endParaRPr kumimoji="1" lang="en-US" altLang="zh-TW" dirty="0" smtClean="0"/>
           </a:p>
@@ -3741,7 +4065,7 @@
           <a:p>
             <a:r>
               <a:rPr lang="zh-TW" altLang="en-US" dirty="0" smtClean="0"/>
-              <a:t>解決方案</a:t>
+              <a:t>系統功能</a:t>
             </a:r>
             <a:endParaRPr lang="zh-TW" altLang="en-US" dirty="0"/>
           </a:p>
@@ -3796,11 +4120,47 @@
             </a:r>
             <a:r>
               <a:rPr kumimoji="1" lang="zh-TW" altLang="en-US" dirty="0"/>
-              <a:t>的筆數，若超過所設定限制</a:t>
+              <a:t>的</a:t>
             </a:r>
             <a:r>
               <a:rPr kumimoji="1" lang="zh-TW" altLang="en-US" dirty="0" smtClean="0"/>
-              <a:t>筆數，則發送</a:t>
+              <a:t>筆數</a:t>
+            </a:r>
+            <a:r>
+              <a:rPr kumimoji="1" lang="zh-TW" altLang="en-US" dirty="0" smtClean="0"/>
+              <a:t>及單筆</a:t>
+            </a:r>
+            <a:r>
+              <a:rPr kumimoji="1" lang="en-US" altLang="zh-TW" dirty="0" smtClean="0"/>
+              <a:t>pending</a:t>
+            </a:r>
+            <a:r>
+              <a:rPr kumimoji="1" lang="zh-TW" altLang="en-US" dirty="0" smtClean="0"/>
+              <a:t>所</a:t>
+            </a:r>
+            <a:r>
+              <a:rPr kumimoji="1" lang="en-US" altLang="zh-TW" dirty="0" smtClean="0"/>
+              <a:t>hang</a:t>
+            </a:r>
+            <a:r>
+              <a:rPr kumimoji="1" lang="zh-TW" altLang="en-US" dirty="0" smtClean="0"/>
+              <a:t>住的時間</a:t>
+            </a:r>
+            <a:r>
+              <a:rPr kumimoji="1" lang="zh-TW" altLang="en-US" dirty="0" smtClean="0"/>
+              <a:t>，</a:t>
+            </a:r>
+            <a:r>
+              <a:rPr kumimoji="1" lang="zh-TW" altLang="en-US" dirty="0"/>
+              <a:t>若超過所設定限制</a:t>
+            </a:r>
+            <a:r>
+              <a:rPr kumimoji="1" lang="zh-TW" altLang="en-US" dirty="0" smtClean="0"/>
+              <a:t>筆數或時間，</a:t>
+            </a:r>
+            <a:r>
+              <a:rPr kumimoji="1" lang="zh-TW" altLang="en-US" dirty="0" smtClean="0"/>
+              <a:t>則發送</a:t>
             </a:r>
             <a:r>
               <a:rPr kumimoji="1" lang="en-US" altLang="zh-TW" dirty="0" smtClean="0"/>
@@ -3816,11 +4176,33 @@
             </a:r>
             <a:r>
               <a:rPr kumimoji="1" lang="zh-TW" altLang="en-US" dirty="0" smtClean="0"/>
-              <a:t>所</a:t>
+              <a:t>所設定收件者</a:t>
             </a:r>
             <a:r>
               <a:rPr kumimoji="1" lang="zh-TW" altLang="en-US" dirty="0" smtClean="0"/>
-              <a:t>設定收件者。</a:t>
+              <a:t>。</a:t>
+            </a:r>
+            <a:endParaRPr kumimoji="1" lang="en-US" altLang="zh-TW" dirty="0" smtClean="0"/>
+          </a:p>
+          <a:p>
+            <a:endParaRPr kumimoji="1" lang="en-US" altLang="zh-TW" dirty="0" smtClean="0"/>
+          </a:p>
+          <a:p>
+            <a:r>
+              <a:rPr kumimoji="1" lang="zh-TW" altLang="en-US" dirty="0" smtClean="0"/>
+              <a:t>可自定義</a:t>
+            </a:r>
+            <a:r>
+              <a:rPr kumimoji="1" lang="en-US" altLang="zh-TW" dirty="0" err="1" smtClean="0"/>
+              <a:t>RegularExpress</a:t>
+            </a:r>
+            <a:r>
+              <a:rPr kumimoji="1" lang="en-US" altLang="zh-TW" dirty="0" smtClean="0"/>
+              <a:t> pattern </a:t>
+            </a:r>
+            <a:r>
+              <a:rPr kumimoji="1" lang="zh-TW" altLang="en-US" dirty="0" smtClean="0"/>
+              <a:t>及所設定的最大允許數量，超過就會發通知給收件者。</a:t>
             </a:r>
             <a:endParaRPr kumimoji="1" lang="en-US" altLang="zh-TW" dirty="0" smtClean="0"/>
           </a:p>
@@ -5062,11 +5444,7 @@
             </a:r>
             <a:r>
               <a:rPr lang="zh-TW" altLang="en-US" dirty="0" smtClean="0"/>
-              <a:t>將</a:t>
-            </a:r>
-            <a:r>
-              <a:rPr lang="zh-TW" altLang="en-US" dirty="0" smtClean="0"/>
-              <a:t>執行</a:t>
+              <a:t>將執行</a:t>
             </a:r>
             <a:r>
               <a:rPr lang="en-US" altLang="zh-TW" dirty="0" smtClean="0"/>
@@ -5080,7 +5458,6 @@
               <a:rPr lang="en-US" altLang="zh-TW" dirty="0" smtClean="0"/>
               <a:t>window service</a:t>
             </a:r>
-            <a:endParaRPr lang="en-US" altLang="zh-TW" dirty="0" smtClean="0"/>
           </a:p>
           <a:p>
             <a:endParaRPr lang="en-US" altLang="zh-TW" dirty="0"/>
@@ -5266,96 +5643,363 @@
         <p:spPr/>
         <p:txBody>
           <a:bodyPr>
-            <a:normAutofit lnSpcReduction="10000"/>
+            <a:normAutofit/>
           </a:bodyPr>
           <a:lstStyle/>
           <a:p>
             <a:r>
-              <a:rPr kumimoji="1" lang="en-US" altLang="zh-TW" dirty="0" err="1"/>
-              <a:t>traceLog</a:t>
-            </a:r>
-            <a:r>
-              <a:rPr kumimoji="1" lang="en-US" altLang="zh-TW" dirty="0"/>
-              <a:t> path</a:t>
-            </a:r>
-          </a:p>
-          <a:p>
-            <a:r>
-              <a:rPr kumimoji="1" lang="zh-TW" altLang="en-US" dirty="0"/>
+              <a:rPr lang="en-US" altLang="zh-TW" dirty="0" err="1" smtClean="0"/>
+              <a:t>intervalTime</a:t>
+            </a:r>
+            <a:r>
+              <a:rPr lang="en-US" altLang="zh-TW" dirty="0" smtClean="0"/>
+              <a:t> </a:t>
+            </a:r>
+            <a:r>
+              <a:rPr lang="en-US" altLang="zh-TW" dirty="0" smtClean="0">
+                <a:solidFill>
+                  <a:srgbClr val="FF0000"/>
+                </a:solidFill>
+              </a:rPr>
+              <a:t>(</a:t>
+            </a:r>
+            <a:r>
+              <a:rPr kumimoji="1" lang="zh-TW" altLang="en-US" dirty="0">
+                <a:solidFill>
+                  <a:srgbClr val="FF0000"/>
+                </a:solidFill>
+              </a:rPr>
               <a:t>啟動間隔</a:t>
             </a:r>
-            <a:endParaRPr kumimoji="1" lang="en-US" altLang="zh-TW" dirty="0"/>
-          </a:p>
-          <a:p>
-            <a:r>
-              <a:rPr kumimoji="1" lang="en-US" altLang="zh-TW" dirty="0"/>
-              <a:t>Pending limit</a:t>
-            </a:r>
-          </a:p>
-          <a:p>
-            <a:r>
-              <a:rPr kumimoji="1" lang="en-US" altLang="zh-TW" dirty="0"/>
-              <a:t>Send Email address (</a:t>
-            </a:r>
-            <a:r>
-              <a:rPr kumimoji="1" lang="en-US" altLang="zh-TW" dirty="0">
-                <a:hlinkClick r:id="rId3"/>
-              </a:rPr>
-              <a:t>xxx@gmail.com,yyy@gmail.com</a:t>
-            </a:r>
-            <a:r>
-              <a:rPr kumimoji="1" lang="en-US" altLang="zh-TW" dirty="0" smtClean="0">
-                <a:hlinkClick r:id="rId3"/>
+            <a:r>
+              <a:rPr lang="en-US" altLang="zh-TW" dirty="0" smtClean="0">
+                <a:solidFill>
+                  <a:srgbClr val="FF0000"/>
+                </a:solidFill>
               </a:rPr>
               <a:t>)</a:t>
             </a:r>
-            <a:endParaRPr kumimoji="1" lang="en-US" altLang="zh-TW" dirty="0"/>
-          </a:p>
-          <a:p>
-            <a:r>
-              <a:rPr kumimoji="1" lang="en-US" altLang="zh-TW" dirty="0"/>
-              <a:t>Email host</a:t>
-            </a:r>
-          </a:p>
-          <a:p>
-            <a:r>
-              <a:rPr kumimoji="1" lang="en-US" altLang="zh-TW" dirty="0"/>
-              <a:t>Email user </a:t>
-            </a:r>
-          </a:p>
-          <a:p>
-            <a:r>
-              <a:rPr kumimoji="1" lang="en-US" altLang="zh-TW" dirty="0"/>
-              <a:t>Email password</a:t>
-            </a:r>
-          </a:p>
-          <a:p>
-            <a:r>
-              <a:rPr kumimoji="1" lang="en-US" altLang="zh-TW" dirty="0"/>
-              <a:t>Email </a:t>
-            </a:r>
-            <a:r>
-              <a:rPr kumimoji="1" lang="en-US" altLang="zh-TW" dirty="0" smtClean="0"/>
-              <a:t>port</a:t>
-            </a:r>
-          </a:p>
-          <a:p>
-            <a:r>
-              <a:rPr kumimoji="1" lang="en-US" altLang="zh-TW" dirty="0" smtClean="0"/>
-              <a:t>Snapshot files folder </a:t>
-            </a:r>
-            <a:endParaRPr kumimoji="1" lang="en-US" altLang="zh-TW" dirty="0" smtClean="0"/>
-          </a:p>
-          <a:p>
-            <a:r>
-              <a:rPr kumimoji="1" lang="en-US" altLang="zh-TW" dirty="0" err="1" smtClean="0"/>
-              <a:t>IssueLogs</a:t>
-            </a:r>
-            <a:r>
-              <a:rPr kumimoji="1" lang="en-US" altLang="zh-TW" dirty="0" smtClean="0"/>
-              <a:t> folder</a:t>
-            </a:r>
-            <a:endParaRPr kumimoji="1" lang="en-US" altLang="zh-TW" dirty="0" smtClean="0"/>
+            <a:endParaRPr lang="en-US" altLang="zh-TW" dirty="0">
+              <a:solidFill>
+                <a:srgbClr val="FF0000"/>
+              </a:solidFill>
+            </a:endParaRPr>
+          </a:p>
+          <a:p>
+            <a:r>
+              <a:rPr lang="en-US" altLang="zh-TW" dirty="0" err="1" smtClean="0"/>
+              <a:t>logFolderPath</a:t>
+            </a:r>
+            <a:r>
+              <a:rPr lang="en-US" altLang="zh-TW" dirty="0" smtClean="0"/>
+              <a:t> </a:t>
+            </a:r>
+            <a:r>
+              <a:rPr lang="en-US" altLang="zh-TW" dirty="0" smtClean="0">
+                <a:solidFill>
+                  <a:srgbClr val="FF0000"/>
+                </a:solidFill>
+              </a:rPr>
+              <a:t>(</a:t>
+            </a:r>
+            <a:r>
+              <a:rPr lang="en-US" altLang="zh-TW" dirty="0" err="1" smtClean="0">
+                <a:solidFill>
+                  <a:srgbClr val="FF0000"/>
+                </a:solidFill>
+              </a:rPr>
+              <a:t>TraceLog</a:t>
+            </a:r>
+            <a:r>
+              <a:rPr lang="en-US" altLang="zh-TW" dirty="0" smtClean="0">
+                <a:solidFill>
+                  <a:srgbClr val="FF0000"/>
+                </a:solidFill>
+              </a:rPr>
+              <a:t> place folder)</a:t>
+            </a:r>
+          </a:p>
+          <a:p>
+            <a:r>
+              <a:rPr lang="en-US" altLang="zh-TW" dirty="0" err="1" smtClean="0"/>
+              <a:t>tempFolderPath</a:t>
+            </a:r>
+            <a:r>
+              <a:rPr lang="en-US" altLang="zh-TW" dirty="0"/>
+              <a:t>=./</a:t>
+            </a:r>
+            <a:r>
+              <a:rPr lang="en-US" altLang="zh-TW" dirty="0" smtClean="0"/>
+              <a:t>Temp/</a:t>
+            </a:r>
+            <a:r>
+              <a:rPr lang="zh-TW" altLang="en-US" dirty="0" smtClean="0"/>
+              <a:t> </a:t>
+            </a:r>
+            <a:r>
+              <a:rPr lang="en-US" altLang="zh-TW" dirty="0" smtClean="0">
+                <a:solidFill>
+                  <a:srgbClr val="FF0000"/>
+                </a:solidFill>
+              </a:rPr>
+              <a:t>(use default)</a:t>
+            </a:r>
+          </a:p>
+          <a:p>
+            <a:r>
+              <a:rPr lang="en-US" altLang="zh-TW" dirty="0" err="1" smtClean="0"/>
+              <a:t>issueLogFolderPath</a:t>
+            </a:r>
+            <a:r>
+              <a:rPr lang="en-US" altLang="zh-TW" dirty="0"/>
+              <a:t>=./</a:t>
+            </a:r>
+            <a:r>
+              <a:rPr lang="en-US" altLang="zh-TW" dirty="0" err="1"/>
+              <a:t>IssueLog</a:t>
+            </a:r>
+            <a:r>
+              <a:rPr lang="en-US" altLang="zh-TW" dirty="0" smtClean="0"/>
+              <a:t>/</a:t>
+            </a:r>
+            <a:r>
+              <a:rPr lang="en-US" altLang="zh-TW" dirty="0" smtClean="0">
+                <a:solidFill>
+                  <a:srgbClr val="FF0000"/>
+                </a:solidFill>
+              </a:rPr>
+              <a:t> </a:t>
+            </a:r>
+            <a:r>
+              <a:rPr lang="en-US" altLang="zh-TW" dirty="0">
+                <a:solidFill>
+                  <a:srgbClr val="FF0000"/>
+                </a:solidFill>
+              </a:rPr>
+              <a:t>(use </a:t>
+            </a:r>
+            <a:r>
+              <a:rPr lang="en-US" altLang="zh-TW" dirty="0" smtClean="0">
+                <a:solidFill>
+                  <a:srgbClr val="FF0000"/>
+                </a:solidFill>
+              </a:rPr>
+              <a:t>default)</a:t>
+            </a:r>
+            <a:endParaRPr lang="en-US" altLang="zh-TW" dirty="0">
+              <a:solidFill>
+                <a:srgbClr val="FF0000"/>
+              </a:solidFill>
+            </a:endParaRPr>
+          </a:p>
+          <a:p>
+            <a:r>
+              <a:rPr lang="en-US" altLang="zh-TW" dirty="0" err="1" smtClean="0"/>
+              <a:t>allowPendingLimit</a:t>
+            </a:r>
+            <a:r>
+              <a:rPr lang="en-US" altLang="zh-TW" dirty="0" smtClean="0"/>
+              <a:t> </a:t>
+            </a:r>
+            <a:r>
+              <a:rPr lang="en-US" altLang="zh-TW" dirty="0" smtClean="0">
+                <a:solidFill>
+                  <a:srgbClr val="FF0000"/>
+                </a:solidFill>
+              </a:rPr>
+              <a:t>(</a:t>
+            </a:r>
+            <a:r>
+              <a:rPr lang="zh-TW" altLang="en-US" dirty="0" smtClean="0">
+                <a:solidFill>
+                  <a:srgbClr val="FF0000"/>
+                </a:solidFill>
+              </a:rPr>
+              <a:t>允許</a:t>
+            </a:r>
+            <a:r>
+              <a:rPr lang="en-US" altLang="zh-TW" dirty="0" smtClean="0">
+                <a:solidFill>
+                  <a:srgbClr val="FF0000"/>
+                </a:solidFill>
+              </a:rPr>
+              <a:t>pending</a:t>
+            </a:r>
+            <a:r>
+              <a:rPr lang="zh-TW" altLang="en-US" dirty="0" smtClean="0">
+                <a:solidFill>
+                  <a:srgbClr val="FF0000"/>
+                </a:solidFill>
+              </a:rPr>
+              <a:t>數量</a:t>
+            </a:r>
+            <a:r>
+              <a:rPr lang="en-US" altLang="zh-TW" dirty="0" smtClean="0">
+                <a:solidFill>
+                  <a:srgbClr val="FF0000"/>
+                </a:solidFill>
+              </a:rPr>
+              <a:t>)</a:t>
+            </a:r>
+          </a:p>
+          <a:p>
+            <a:r>
+              <a:rPr lang="en-US" altLang="zh-TW" dirty="0" err="1" smtClean="0"/>
+              <a:t>allowPendingTimeLimit</a:t>
+            </a:r>
+            <a:r>
+              <a:rPr lang="zh-TW" altLang="en-US" dirty="0" smtClean="0">
+                <a:solidFill>
+                  <a:srgbClr val="FF0000"/>
+                </a:solidFill>
+              </a:rPr>
+              <a:t> </a:t>
+            </a:r>
+            <a:r>
+              <a:rPr lang="en-US" altLang="zh-TW" dirty="0" smtClean="0">
+                <a:solidFill>
+                  <a:srgbClr val="FF0000"/>
+                </a:solidFill>
+              </a:rPr>
+              <a:t>(</a:t>
+            </a:r>
+            <a:r>
+              <a:rPr lang="zh-TW" altLang="en-US" dirty="0" smtClean="0">
+                <a:solidFill>
+                  <a:srgbClr val="FF0000"/>
+                </a:solidFill>
+              </a:rPr>
+              <a:t>允許單</a:t>
+            </a:r>
+            <a:r>
+              <a:rPr lang="en-US" altLang="zh-TW" dirty="0" smtClean="0">
+                <a:solidFill>
+                  <a:srgbClr val="FF0000"/>
+                </a:solidFill>
+              </a:rPr>
+              <a:t>thread</a:t>
+            </a:r>
+            <a:r>
+              <a:rPr lang="zh-TW" altLang="en-US" dirty="0" smtClean="0">
+                <a:solidFill>
+                  <a:srgbClr val="FF0000"/>
+                </a:solidFill>
+              </a:rPr>
+              <a:t>能</a:t>
+            </a:r>
+            <a:r>
+              <a:rPr lang="en-US" altLang="zh-TW" dirty="0" smtClean="0">
+                <a:solidFill>
+                  <a:srgbClr val="FF0000"/>
+                </a:solidFill>
+              </a:rPr>
+              <a:t>pending</a:t>
+            </a:r>
+            <a:r>
+              <a:rPr lang="zh-TW" altLang="en-US" dirty="0" smtClean="0">
+                <a:solidFill>
+                  <a:srgbClr val="FF0000"/>
+                </a:solidFill>
+              </a:rPr>
+              <a:t>的秒數</a:t>
+            </a:r>
+            <a:r>
+              <a:rPr lang="en-US" altLang="zh-TW" dirty="0" smtClean="0">
+                <a:solidFill>
+                  <a:srgbClr val="FF0000"/>
+                </a:solidFill>
+              </a:rPr>
+              <a:t>)</a:t>
+            </a:r>
+            <a:endParaRPr lang="en-US" altLang="zh-TW" dirty="0">
+              <a:solidFill>
+                <a:srgbClr val="FF0000"/>
+              </a:solidFill>
+            </a:endParaRPr>
+          </a:p>
+          <a:p>
+            <a:r>
+              <a:rPr lang="en-US" altLang="zh-TW" dirty="0" err="1" smtClean="0"/>
+              <a:t>emailSendTargets</a:t>
+            </a:r>
+            <a:r>
+              <a:rPr lang="zh-TW" altLang="en-US" dirty="0" smtClean="0"/>
+              <a:t> </a:t>
+            </a:r>
+            <a:r>
+              <a:rPr lang="en-US" altLang="zh-TW" dirty="0" smtClean="0">
+                <a:solidFill>
+                  <a:srgbClr val="FF0000"/>
+                </a:solidFill>
+              </a:rPr>
+              <a:t>(email</a:t>
+            </a:r>
+            <a:r>
+              <a:rPr lang="zh-TW" altLang="en-US" dirty="0" smtClean="0">
+                <a:solidFill>
+                  <a:srgbClr val="FF0000"/>
+                </a:solidFill>
+              </a:rPr>
+              <a:t>寄送目標</a:t>
+            </a:r>
+            <a:r>
+              <a:rPr lang="en-US" altLang="zh-TW" dirty="0" smtClean="0">
+                <a:solidFill>
+                  <a:srgbClr val="FF0000"/>
+                </a:solidFill>
+              </a:rPr>
+              <a:t>)</a:t>
+            </a:r>
+          </a:p>
+          <a:p>
+            <a:r>
+              <a:rPr lang="en-US" altLang="zh-TW" dirty="0" err="1" smtClean="0"/>
+              <a:t>smsSendTargets</a:t>
+            </a:r>
+            <a:r>
+              <a:rPr lang="zh-TW" altLang="en-US" dirty="0" smtClean="0"/>
+              <a:t> </a:t>
+            </a:r>
+            <a:r>
+              <a:rPr lang="en-US" altLang="zh-TW" dirty="0" smtClean="0">
+                <a:solidFill>
+                  <a:srgbClr val="FF0000"/>
+                </a:solidFill>
+              </a:rPr>
+              <a:t>(</a:t>
+            </a:r>
+            <a:r>
+              <a:rPr lang="en-US" altLang="zh-TW" dirty="0" err="1" smtClean="0">
+                <a:solidFill>
+                  <a:srgbClr val="FF0000"/>
+                </a:solidFill>
+              </a:rPr>
+              <a:t>sms</a:t>
+            </a:r>
+            <a:r>
+              <a:rPr lang="zh-TW" altLang="en-US" dirty="0" smtClean="0">
+                <a:solidFill>
+                  <a:srgbClr val="FF0000"/>
+                </a:solidFill>
+              </a:rPr>
+              <a:t>寄</a:t>
+            </a:r>
+            <a:r>
+              <a:rPr lang="zh-TW" altLang="en-US" dirty="0">
+                <a:solidFill>
+                  <a:srgbClr val="FF0000"/>
+                </a:solidFill>
+              </a:rPr>
+              <a:t>送目標</a:t>
+            </a:r>
+            <a:r>
+              <a:rPr lang="en-US" altLang="zh-TW" dirty="0">
+                <a:solidFill>
+                  <a:srgbClr val="FF0000"/>
+                </a:solidFill>
+              </a:rPr>
+              <a:t>)</a:t>
+            </a:r>
           </a:p>
           <a:p>
             <a:endParaRPr kumimoji="1" lang="en-US" altLang="zh-TW" dirty="0"/>
@@ -5368,7 +6012,7 @@
     </p:spTree>
     <p:extLst>
       <p:ext uri="{BB962C8B-B14F-4D97-AF65-F5344CB8AC3E}">
-        <p14:creationId xmlns:p14="http://schemas.microsoft.com/office/powerpoint/2010/main" val="826924996"/>
+        <p14:creationId xmlns:p14="http://schemas.microsoft.com/office/powerpoint/2010/main" val="137870020"/>
       </p:ext>
     </p:extLst>
   </p:cSld>
@@ -5427,6 +6071,18 @@
               <a:rPr kumimoji="1" lang="zh-TW" altLang="en-US" dirty="0" smtClean="0"/>
               <a:t>變數</a:t>
             </a:r>
+            <a:r>
+              <a:rPr kumimoji="1" lang="en-US" altLang="zh-TW" dirty="0" smtClean="0"/>
+              <a:t>(</a:t>
+            </a:r>
+            <a:r>
+              <a:rPr kumimoji="1" lang="zh-TW" altLang="en-US" dirty="0" smtClean="0"/>
+              <a:t>自定義</a:t>
+            </a:r>
+            <a:r>
+              <a:rPr kumimoji="1" lang="en-US" altLang="zh-TW" dirty="0" smtClean="0"/>
+              <a:t>)</a:t>
+            </a:r>
             <a:endParaRPr lang="zh-TW" altLang="en-US" dirty="0"/>
           </a:p>
         </p:txBody>
@@ -5449,130 +6105,265 @@
           <a:lstStyle/>
           <a:p>
             <a:r>
+              <a:rPr lang="zh-TW" altLang="en-US" dirty="0" smtClean="0"/>
+              <a:t>自定義要掃描的</a:t>
+            </a:r>
+            <a:r>
+              <a:rPr lang="en-US" altLang="zh-TW" dirty="0" smtClean="0"/>
+              <a:t>pattern</a:t>
+            </a:r>
+            <a:r>
+              <a:rPr lang="zh-TW" altLang="en-US" dirty="0" smtClean="0"/>
+              <a:t>，</a:t>
+            </a:r>
+            <a:r>
+              <a:rPr lang="en-US" altLang="zh-TW" dirty="0" smtClean="0"/>
+              <a:t>N</a:t>
+            </a:r>
+            <a:r>
+              <a:rPr lang="zh-TW" altLang="en-US" dirty="0" smtClean="0"/>
+              <a:t>為排序數字，至多</a:t>
+            </a:r>
+            <a:r>
+              <a:rPr lang="en-US" altLang="zh-TW" dirty="0" smtClean="0"/>
+              <a:t>100</a:t>
+            </a:r>
+            <a:r>
+              <a:rPr lang="zh-TW" altLang="en-US" dirty="0" smtClean="0"/>
+              <a:t>筆自訂</a:t>
+            </a:r>
+            <a:r>
+              <a:rPr lang="en-US" altLang="zh-TW" dirty="0" smtClean="0"/>
+              <a:t>pattern</a:t>
+            </a:r>
+          </a:p>
+          <a:p>
+            <a:endParaRPr lang="en-US" altLang="zh-TW" dirty="0"/>
+          </a:p>
+          <a:p>
+            <a:r>
               <a:rPr lang="en-US" altLang="zh-TW" dirty="0" err="1" smtClean="0"/>
-              <a:t>sms.host</a:t>
+              <a:t>otherScan.patternN</a:t>
+            </a:r>
+            <a:r>
+              <a:rPr lang="en-US" altLang="zh-TW" dirty="0" smtClean="0"/>
+              <a:t> (regular express pattern)</a:t>
             </a:r>
             <a:endParaRPr lang="en-US" altLang="zh-TW" dirty="0"/>
           </a:p>
           <a:p>
             <a:r>
               <a:rPr lang="en-US" altLang="zh-TW" dirty="0" err="1" smtClean="0"/>
-              <a:t>sms.port</a:t>
-            </a:r>
-            <a:endParaRPr lang="en-US" altLang="zh-TW" dirty="0"/>
-          </a:p>
-          <a:p>
-            <a:r>
-              <a:rPr lang="en-US" altLang="zh-TW" dirty="0" err="1" smtClean="0"/>
-              <a:t>sms.entry</a:t>
-            </a:r>
-            <a:endParaRPr lang="en-US" altLang="zh-TW" dirty="0"/>
-          </a:p>
-          <a:p>
-            <a:r>
-              <a:rPr lang="en-US" altLang="zh-TW" dirty="0" err="1" smtClean="0"/>
-              <a:t>sms.username</a:t>
-            </a:r>
-            <a:endParaRPr lang="en-US" altLang="zh-TW" dirty="0" smtClean="0"/>
-          </a:p>
-          <a:p>
-            <a:r>
-              <a:rPr lang="en-US" altLang="zh-TW" dirty="0" err="1" smtClean="0"/>
-              <a:t>sms.password</a:t>
-            </a:r>
-            <a:endParaRPr lang="en-US" altLang="zh-TW" dirty="0" smtClean="0"/>
-          </a:p>
-          <a:p>
-            <a:r>
-              <a:rPr lang="en-US" altLang="zh-TW" dirty="0" err="1" smtClean="0"/>
-              <a:t>proxy.enable</a:t>
-            </a:r>
-            <a:endParaRPr lang="en-US" altLang="zh-TW" dirty="0" smtClean="0"/>
-          </a:p>
-          <a:p>
-            <a:r>
-              <a:rPr lang="en-US" altLang="zh-TW" dirty="0" err="1" smtClean="0"/>
-              <a:t>proxy.host</a:t>
-            </a:r>
-            <a:endParaRPr lang="en-US" altLang="zh-TW" dirty="0" smtClean="0"/>
-          </a:p>
-          <a:p>
-            <a:r>
-              <a:rPr lang="en-US" altLang="zh-TW" dirty="0" err="1" smtClean="0"/>
-              <a:t>proxy.port</a:t>
-            </a:r>
-            <a:endParaRPr lang="en-US" altLang="zh-TW" dirty="0"/>
-          </a:p>
-          <a:p>
-            <a:r>
-              <a:rPr lang="en-US" altLang="zh-TW" dirty="0" err="1" smtClean="0"/>
-              <a:t>sms.encoding</a:t>
-            </a:r>
-            <a:endParaRPr lang="en-US" altLang="zh-TW" dirty="0" smtClean="0"/>
-          </a:p>
-          <a:p>
-            <a:r>
-              <a:rPr lang="en-US" altLang="zh-TW" dirty="0" err="1" smtClean="0"/>
-              <a:t>emailSendTargets</a:t>
+              <a:t>otherScan.allowCountN</a:t>
             </a:r>
             <a:r>
               <a:rPr lang="en-US" altLang="zh-TW" dirty="0" smtClean="0"/>
-              <a:t>(</a:t>
-            </a:r>
-            <a:r>
-              <a:rPr lang="cs-CZ" altLang="zh-TW" dirty="0" smtClean="0"/>
-              <a:t>09XXXXXXXX,09XXXXXXXX</a:t>
+              <a:t> (</a:t>
+            </a:r>
+            <a:r>
+              <a:rPr lang="zh-TW" altLang="en-US" dirty="0" smtClean="0"/>
+              <a:t>該掃描所允許的數量</a:t>
             </a:r>
             <a:r>
               <a:rPr lang="en-US" altLang="zh-TW" dirty="0" smtClean="0"/>
               <a:t>)</a:t>
             </a:r>
-            <a:endParaRPr kumimoji="1" lang="en-US" altLang="zh-TW" dirty="0" smtClean="0"/>
-          </a:p>
-          <a:p>
+            <a:r>
+              <a:rPr kumimoji="1" lang="en-US" altLang="zh-TW" dirty="0"/>
+              <a:t/>
+            </a:r>
+            <a:br>
+              <a:rPr kumimoji="1" lang="en-US" altLang="zh-TW" dirty="0"/>
+            </a:br>
+            <a:r>
+              <a:rPr kumimoji="1" lang="en-US" altLang="zh-TW" dirty="0" smtClean="0"/>
+              <a:t/>
+            </a:r>
+            <a:br>
+              <a:rPr kumimoji="1" lang="en-US" altLang="zh-TW" dirty="0" smtClean="0"/>
+            </a:br>
+            <a:r>
+              <a:rPr kumimoji="1" lang="en-US" altLang="zh-TW" dirty="0" smtClean="0"/>
+              <a:t/>
+            </a:r>
+            <a:br>
+              <a:rPr kumimoji="1" lang="en-US" altLang="zh-TW" dirty="0" smtClean="0"/>
+            </a:br>
+            <a:r>
+              <a:rPr kumimoji="1" lang="en-US" altLang="zh-TW" dirty="0" smtClean="0"/>
+              <a:t>ex: </a:t>
+            </a:r>
+            <a:br>
+              <a:rPr kumimoji="1" lang="en-US" altLang="zh-TW" dirty="0" smtClean="0"/>
+            </a:br>
+            <a:r>
+              <a:rPr lang="en-US" altLang="zh-TW" dirty="0" smtClean="0"/>
+              <a:t>otherScan.pattern1=[0-9]{10}</a:t>
+            </a:r>
+            <a:r>
+              <a:rPr lang="en-US" altLang="zh-TW" dirty="0"/>
+              <a:t/>
+            </a:r>
+            <a:br>
+              <a:rPr lang="en-US" altLang="zh-TW" dirty="0"/>
+            </a:br>
+            <a:r>
+              <a:rPr lang="en-US" altLang="zh-TW" dirty="0" smtClean="0"/>
+              <a:t>otherScan.allowCount1=10</a:t>
+            </a:r>
             <a:endParaRPr kumimoji="1" lang="en-US" altLang="zh-TW" dirty="0"/>
-          </a:p>
-          <a:p>
-            <a:endParaRPr kumimoji="1" lang="en-US" altLang="zh-TW" dirty="0"/>
-          </a:p>
-        </p:txBody>
-      </p:sp>
-      <p:sp>
-        <p:nvSpPr>
-          <p:cNvPr id="4" name="文字方塊 3"/>
-          <p:cNvSpPr txBox="1"/>
-          <p:nvPr/>
-        </p:nvSpPr>
-        <p:spPr>
-          <a:xfrm>
-            <a:off x="6372200" y="6126163"/>
-            <a:ext cx="1110304" cy="646331"/>
-          </a:xfrm>
-          <a:prstGeom prst="rect">
-            <a:avLst/>
-          </a:prstGeom>
-          <a:noFill/>
-        </p:spPr>
-        <p:txBody>
-          <a:bodyPr wrap="none" rtlCol="0">
-            <a:spAutoFit/>
-          </a:bodyPr>
-          <a:lstStyle/>
-          <a:p>
-            <a:r>
-              <a:rPr kumimoji="1" lang="en-US" altLang="zh-TW" dirty="0" smtClean="0"/>
-              <a:t>*Optional</a:t>
-            </a:r>
-          </a:p>
-          <a:p>
-            <a:endParaRPr kumimoji="1" lang="zh-TW" altLang="en-US" dirty="0"/>
           </a:p>
         </p:txBody>
       </p:sp>
     </p:spTree>
     <p:extLst>
       <p:ext uri="{BB962C8B-B14F-4D97-AF65-F5344CB8AC3E}">
-        <p14:creationId xmlns:p14="http://schemas.microsoft.com/office/powerpoint/2010/main" val="620102000"/>
+        <p14:creationId xmlns:p14="http://schemas.microsoft.com/office/powerpoint/2010/main" val="322553950"/>
+      </p:ext>
+    </p:extLst>
+  </p:cSld>
+  <p:clrMapOvr>
+    <a:masterClrMapping/>
+  </p:clrMapOvr>
+  <p:timing>
+    <p:tnLst>
+      <p:par>
+        <p:cTn id="1" dur="indefinite" restart="never" nodeType="tmRoot"/>
+      </p:par>
+    </p:tnLst>
+  </p:timing>
+</p:sld>
+</file>
+
+<file path=ppt/slides/slide9.xml><?xml version="1.0" encoding="utf-8"?>
+<p:sld xmlns:a="http://schemas.openxmlformats.org/drawingml/2006/main" xmlns:r="http://schemas.openxmlformats.org/officeDocument/2006/relationships" xmlns:p="http://schemas.openxmlformats.org/presentationml/2006/main">
+  <p:cSld>
+    <p:spTree>
+      <p:nvGrpSpPr>
+        <p:cNvPr id="1" name=""/>
+        <p:cNvGrpSpPr/>
+        <p:nvPr/>
+      </p:nvGrpSpPr>
+      <p:grpSpPr>
+        <a:xfrm>
+          <a:off x="0" y="0"/>
+          <a:ext cx="0" cy="0"/>
+          <a:chOff x="0" y="0"/>
+          <a:chExt cx="0" cy="0"/>
+        </a:xfrm>
+      </p:grpSpPr>
+      <p:sp>
+        <p:nvSpPr>
+          <p:cNvPr id="2" name="標題 1"/>
+          <p:cNvSpPr>
+            <a:spLocks noGrp="1"/>
+          </p:cNvSpPr>
+          <p:nvPr>
+            <p:ph type="title"/>
+          </p:nvPr>
+        </p:nvSpPr>
+        <p:spPr/>
+        <p:txBody>
+          <a:bodyPr>
+            <a:normAutofit/>
+          </a:bodyPr>
+          <a:lstStyle/>
+          <a:p>
+            <a:r>
+              <a:rPr kumimoji="1" lang="zh-TW" altLang="en-US" dirty="0"/>
+              <a:t>參數檔</a:t>
+            </a:r>
+            <a:r>
+              <a:rPr kumimoji="1" lang="zh-TW" altLang="en-US" dirty="0" smtClean="0"/>
+              <a:t>變數</a:t>
+            </a:r>
+            <a:r>
+              <a:rPr kumimoji="1" lang="en-US" altLang="zh-TW" dirty="0" smtClean="0"/>
+              <a:t>(email)</a:t>
+            </a:r>
+            <a:endParaRPr lang="zh-TW" altLang="en-US" dirty="0"/>
+          </a:p>
+        </p:txBody>
+      </p:sp>
+      <p:sp>
+        <p:nvSpPr>
+          <p:cNvPr id="3" name="內容版面配置區 2"/>
+          <p:cNvSpPr>
+            <a:spLocks noGrp="1"/>
+          </p:cNvSpPr>
+          <p:nvPr>
+            <p:ph idx="1"/>
+          </p:nvPr>
+        </p:nvSpPr>
+        <p:spPr/>
+        <p:txBody>
+          <a:bodyPr>
+            <a:normAutofit/>
+          </a:bodyPr>
+          <a:lstStyle/>
+          <a:p>
+            <a:r>
+              <a:rPr lang="es-ES_tradnl" altLang="zh-TW" dirty="0" smtClean="0"/>
+              <a:t>LOCAL_TEST(</a:t>
+            </a:r>
+            <a:r>
+              <a:rPr lang="zh-TW" altLang="en-US" dirty="0" smtClean="0"/>
+              <a:t>是否要用內建</a:t>
+            </a:r>
+            <a:r>
+              <a:rPr lang="en-US" altLang="zh-TW" dirty="0" err="1" smtClean="0"/>
+              <a:t>gmail</a:t>
+            </a:r>
+            <a:r>
+              <a:rPr lang="zh-TW" altLang="en-US" dirty="0" smtClean="0"/>
+              <a:t>帳號寄送</a:t>
+            </a:r>
+            <a:r>
+              <a:rPr lang="en-US" altLang="zh-TW" dirty="0" smtClean="0"/>
+              <a:t>email</a:t>
+            </a:r>
+            <a:r>
+              <a:rPr lang="es-ES_tradnl" altLang="zh-TW" dirty="0" smtClean="0"/>
+              <a:t>)</a:t>
+            </a:r>
+          </a:p>
+          <a:p>
+            <a:r>
+              <a:rPr lang="es-ES_tradnl" altLang="zh-TW" dirty="0" smtClean="0"/>
+              <a:t>EDM_FROM_ADDR</a:t>
+            </a:r>
+          </a:p>
+          <a:p>
+            <a:r>
+              <a:rPr lang="es-ES_tradnl" altLang="zh-TW" dirty="0" smtClean="0"/>
+              <a:t>EDM_FROM_PERSON</a:t>
+            </a:r>
+          </a:p>
+          <a:p>
+            <a:r>
+              <a:rPr lang="es-ES_tradnl" altLang="zh-TW" dirty="0" smtClean="0"/>
+              <a:t>EDM_HOST</a:t>
+            </a:r>
+          </a:p>
+          <a:p>
+            <a:r>
+              <a:rPr lang="es-ES_tradnl" altLang="zh-TW" dirty="0" smtClean="0"/>
+              <a:t>EDM_USR</a:t>
+            </a:r>
+          </a:p>
+          <a:p>
+            <a:r>
+              <a:rPr lang="es-ES_tradnl" altLang="zh-TW" dirty="0" smtClean="0"/>
+              <a:t>EDM_PWD</a:t>
+            </a:r>
+            <a:endParaRPr kumimoji="1" lang="en-US" altLang="zh-TW" dirty="0"/>
+          </a:p>
+        </p:txBody>
+      </p:sp>
+    </p:spTree>
+    <p:extLst>
+      <p:ext uri="{BB962C8B-B14F-4D97-AF65-F5344CB8AC3E}">
+        <p14:creationId xmlns:p14="http://schemas.microsoft.com/office/powerpoint/2010/main" val="1519779737"/>
       </p:ext>
     </p:extLst>
   </p:cSld>

</xml_diff>